<commit_message>
20-21 School Year Update #1
</commit_message>
<xml_diff>
--- a/High School/Design and Drawing for Production/Unit 1 - Introduction/Section 1 - Syllabus Overview/Assets/U1S1 - Syllabus.pptx
+++ b/High School/Design and Drawing for Production/Unit 1 - Introduction/Section 1 - Syllabus Overview/Assets/U1S1 - Syllabus.pptx
@@ -5,18 +5,17 @@
     <p:sldMasterId id="2147483648" r:id="rId1"/>
   </p:sldMasterIdLst>
   <p:notesMasterIdLst>
-    <p:notesMasterId r:id="rId8"/>
+    <p:notesMasterId r:id="rId7"/>
   </p:notesMasterIdLst>
   <p:handoutMasterIdLst>
-    <p:handoutMasterId r:id="rId9"/>
+    <p:handoutMasterId r:id="rId8"/>
   </p:handoutMasterIdLst>
   <p:sldIdLst>
     <p:sldId id="268" r:id="rId2"/>
-    <p:sldId id="269" r:id="rId3"/>
-    <p:sldId id="271" r:id="rId4"/>
+    <p:sldId id="271" r:id="rId3"/>
+    <p:sldId id="269" r:id="rId4"/>
     <p:sldId id="273" r:id="rId5"/>
     <p:sldId id="270" r:id="rId6"/>
-    <p:sldId id="272" r:id="rId7"/>
   </p:sldIdLst>
   <p:sldSz cx="12192000" cy="6858000"/>
   <p:notesSz cx="6858000" cy="9144000"/>
@@ -219,7 +218,7 @@
           <a:p>
             <a:fld id="{6AC4FB8F-ED15-48AB-97BD-17129D4E699D}" type="datetimeFigureOut">
               <a:rPr lang="en-US" smtClean="0"/>
-              <a:t>9/5/2018</a:t>
+              <a:t>9/8/2020</a:t>
             </a:fld>
             <a:endParaRPr lang="en-US" dirty="0"/>
           </a:p>
@@ -384,7 +383,7 @@
           <a:p>
             <a:fld id="{BBC9D437-CD83-4825-AD0D-5E7B341BC79B}" type="datetimeFigureOut">
               <a:rPr lang="en-US" smtClean="0"/>
-              <a:t>9/5/2018</a:t>
+              <a:t>9/8/2020</a:t>
             </a:fld>
             <a:endParaRPr lang="en-US" dirty="0"/>
           </a:p>
@@ -810,7 +809,7 @@
           <a:p>
             <a:fld id="{85AB7CBB-843F-464A-A764-71D6ADC27CFA}" type="datetime1">
               <a:rPr lang="en-US" smtClean="0"/>
-              <a:t>9/5/2018</a:t>
+              <a:t>9/8/2020</a:t>
             </a:fld>
             <a:endParaRPr lang="en-US" dirty="0"/>
           </a:p>
@@ -995,7 +994,7 @@
           <a:p>
             <a:fld id="{CBEFC03D-3A1F-4813-9337-02411FCC3A9A}" type="datetime1">
               <a:rPr lang="en-US" smtClean="0"/>
-              <a:t>9/5/2018</a:t>
+              <a:t>9/8/2020</a:t>
             </a:fld>
             <a:endParaRPr lang="en-US" dirty="0"/>
           </a:p>
@@ -1193,7 +1192,7 @@
           <a:p>
             <a:fld id="{3D638F79-DFA0-4C26-9553-23A017B69AB6}" type="datetime1">
               <a:rPr lang="en-US" smtClean="0"/>
-              <a:t>9/5/2018</a:t>
+              <a:t>9/8/2020</a:t>
             </a:fld>
             <a:endParaRPr lang="en-US" dirty="0"/>
           </a:p>
@@ -1387,7 +1386,7 @@
           <a:p>
             <a:fld id="{A70B34E7-E1D9-4FBF-A1A0-4009669A00BF}" type="datetime1">
               <a:rPr lang="en-US" smtClean="0"/>
-              <a:t>9/5/2018</a:t>
+              <a:t>9/8/2020</a:t>
             </a:fld>
             <a:endParaRPr lang="en-US" dirty="0"/>
           </a:p>
@@ -1876,7 +1875,7 @@
           <a:p>
             <a:fld id="{7579E8B6-2F47-420B-83EA-EB2285D13EC9}" type="datetime1">
               <a:rPr lang="en-US" smtClean="0"/>
-              <a:t>9/5/2018</a:t>
+              <a:t>9/8/2020</a:t>
             </a:fld>
             <a:endParaRPr lang="en-US" dirty="0"/>
           </a:p>
@@ -2314,7 +2313,7 @@
           <a:p>
             <a:fld id="{2304803D-B10E-4B90-8456-A0E05393E233}" type="datetime1">
               <a:rPr lang="en-US" smtClean="0"/>
-              <a:t>9/5/2018</a:t>
+              <a:t>9/8/2020</a:t>
             </a:fld>
             <a:endParaRPr lang="en-US" dirty="0"/>
           </a:p>
@@ -2447,7 +2446,7 @@
           <a:p>
             <a:fld id="{CCE1E62F-6CCE-4064-96C2-2084AF883904}" type="datetime1">
               <a:rPr lang="en-US" smtClean="0"/>
-              <a:t>9/5/2018</a:t>
+              <a:t>9/8/2020</a:t>
             </a:fld>
             <a:endParaRPr lang="en-US" dirty="0"/>
           </a:p>
@@ -2557,7 +2556,7 @@
           <a:p>
             <a:fld id="{AA615CA6-EC4D-4728-8AA6-534BE7E9B67C}" type="datetime1">
               <a:rPr lang="en-US" smtClean="0"/>
-              <a:t>9/5/2018</a:t>
+              <a:t>9/8/2020</a:t>
             </a:fld>
             <a:endParaRPr lang="en-US" dirty="0"/>
           </a:p>
@@ -2871,7 +2870,7 @@
           <a:p>
             <a:fld id="{A6139942-0A2E-443A-842F-D6DE74360370}" type="datetime1">
               <a:rPr lang="en-US" smtClean="0"/>
-              <a:t>9/5/2018</a:t>
+              <a:t>9/8/2020</a:t>
             </a:fld>
             <a:endParaRPr lang="en-US" dirty="0"/>
           </a:p>
@@ -3388,7 +3387,7 @@
           <a:p>
             <a:fld id="{3F138946-C5C1-4A11-BA69-F12F43F8A94B}" type="datetime1">
               <a:rPr lang="en-US" smtClean="0"/>
-              <a:t>9/5/2018</a:t>
+              <a:t>9/8/2020</a:t>
             </a:fld>
             <a:endParaRPr lang="en-US" dirty="0"/>
           </a:p>
@@ -3803,7 +3802,7 @@
       </a:lvl9pPr>
     </p:otherStyle>
   </p:txStyles>
-  <p:extLst mod="1">
+  <p:extLst>
     <p:ext uri="{27BBF7A9-308A-43DC-89C8-2F10F3537804}">
       <p15:sldGuideLst xmlns:p15="http://schemas.microsoft.com/office/powerpoint/2012/main">
         <p15:guide id="1" orient="horz" pos="2160" userDrawn="1">
@@ -3874,13 +3873,13 @@
         <p:spPr/>
         <p:txBody>
           <a:bodyPr>
-            <a:normAutofit fontScale="77500" lnSpcReduction="20000"/>
+            <a:normAutofit fontScale="92500" lnSpcReduction="10000"/>
           </a:bodyPr>
           <a:lstStyle/>
           <a:p>
             <a:r>
               <a:rPr lang="en-US" dirty="0"/>
-              <a:t>Unit 1 – Introduction &amp; Design Process</a:t>
+              <a:t>Unit 1 – Introduction</a:t>
             </a:r>
           </a:p>
           <a:p>
@@ -3889,7 +3888,7 @@
           <a:p>
             <a:r>
               <a:rPr lang="en-US" dirty="0"/>
-              <a:t>Section 1 - Syllabus Overview And Classroom Operations</a:t>
+              <a:t>Section 1 - Syllabus Overview And Classroom Ops</a:t>
             </a:r>
           </a:p>
         </p:txBody>
@@ -3981,13 +3980,8 @@
           <a:p>
             <a:r>
               <a:rPr lang="en-US" dirty="0"/>
-              <a:t>To be successful in </a:t>
-            </a:r>
-            <a:r>
-              <a:rPr lang="en-US" dirty="0" err="1"/>
-              <a:t>ddp</a:t>
-            </a:r>
-            <a:endParaRPr lang="en-US" dirty="0"/>
+              <a:t>The big idea</a:t>
+            </a:r>
           </a:p>
         </p:txBody>
       </p:sp>
@@ -4003,16 +3997,14 @@
         </p:nvSpPr>
         <p:spPr/>
         <p:txBody>
-          <a:bodyPr>
-            <a:normAutofit/>
-          </a:bodyPr>
+          <a:bodyPr/>
           <a:lstStyle/>
           <a:p>
             <a:r>
               <a:rPr lang="en-US" dirty="0">
                 <a:cs typeface="Arial" pitchFamily="34" charset="0"/>
               </a:rPr>
-              <a:t>Be Prepared</a:t>
+              <a:t>Introduce the course syllabus to know what units and sections are scheduled and what assignments are due.</a:t>
             </a:r>
           </a:p>
           <a:p>
@@ -4020,7 +4012,7 @@
               <a:rPr lang="en-US" dirty="0">
                 <a:cs typeface="Arial" pitchFamily="34" charset="0"/>
               </a:rPr>
-              <a:t>Be Respectful</a:t>
+              <a:t>Introduce classroom operations and procedures for a safe and exciting working environment.</a:t>
             </a:r>
           </a:p>
           <a:p>
@@ -4028,34 +4020,7 @@
               <a:rPr lang="en-US" dirty="0">
                 <a:cs typeface="Arial" pitchFamily="34" charset="0"/>
               </a:rPr>
-              <a:t>Be on-time</a:t>
-            </a:r>
-          </a:p>
-          <a:p>
-            <a:r>
-              <a:rPr lang="en-US" dirty="0">
-                <a:cs typeface="Arial" pitchFamily="34" charset="0"/>
-              </a:rPr>
-              <a:t>1 x folder</a:t>
-            </a:r>
-          </a:p>
-          <a:p>
-            <a:r>
-              <a:rPr lang="en-US" dirty="0">
-                <a:cs typeface="Arial" pitchFamily="34" charset="0"/>
-              </a:rPr>
-              <a:t>1 x 3 ring binder with paper OR notebook for notes, sketches and ideation</a:t>
-            </a:r>
-          </a:p>
-          <a:p>
-            <a:pPr marL="0" indent="0">
-              <a:buNone/>
-            </a:pPr>
-            <a:r>
-              <a:rPr lang="en-US" sz="1400" dirty="0">
-                <a:cs typeface="Arial" pitchFamily="34" charset="0"/>
-              </a:rPr>
-              <a:t>***Laptops are allowed and encouraged as long as they are utilized towards course work and not a distraction or they will not be permitted in class. All students are provided the G Suite of tools via Google and their school account.***</a:t>
+              <a:t>Introduce DDP concepts and its importance</a:t>
             </a:r>
           </a:p>
         </p:txBody>
@@ -4091,7 +4056,7 @@
     </p:spTree>
     <p:extLst>
       <p:ext uri="{BB962C8B-B14F-4D97-AF65-F5344CB8AC3E}">
-        <p14:creationId xmlns:p14="http://schemas.microsoft.com/office/powerpoint/2010/main" val="2523332612"/>
+        <p14:creationId xmlns:p14="http://schemas.microsoft.com/office/powerpoint/2010/main" val="78530218"/>
       </p:ext>
     </p:extLst>
   </p:cSld>
@@ -4147,8 +4112,13 @@
           <a:p>
             <a:r>
               <a:rPr lang="en-US" dirty="0"/>
-              <a:t>The big idea</a:t>
-            </a:r>
+              <a:t>To be successful in </a:t>
+            </a:r>
+            <a:r>
+              <a:rPr lang="en-US" dirty="0" err="1"/>
+              <a:t>ddp</a:t>
+            </a:r>
+            <a:endParaRPr lang="en-US" dirty="0"/>
           </a:p>
         </p:txBody>
       </p:sp>
@@ -4164,14 +4134,16 @@
         </p:nvSpPr>
         <p:spPr/>
         <p:txBody>
-          <a:bodyPr/>
+          <a:bodyPr>
+            <a:normAutofit/>
+          </a:bodyPr>
           <a:lstStyle/>
           <a:p>
             <a:r>
               <a:rPr lang="en-US" dirty="0">
                 <a:cs typeface="Arial" pitchFamily="34" charset="0"/>
               </a:rPr>
-              <a:t>Introduce the course syllabus to know what units and sections are scheduled and what assignments are due.</a:t>
+              <a:t>Be Prepared</a:t>
             </a:r>
           </a:p>
           <a:p>
@@ -4179,7 +4151,50 @@
               <a:rPr lang="en-US" dirty="0">
                 <a:cs typeface="Arial" pitchFamily="34" charset="0"/>
               </a:rPr>
-              <a:t>Introduce classroom operations and procedures for a safe and exciting working environment.</a:t>
+              <a:t>Be Respectful</a:t>
+            </a:r>
+          </a:p>
+          <a:p>
+            <a:r>
+              <a:rPr lang="en-US" dirty="0">
+                <a:cs typeface="Arial" pitchFamily="34" charset="0"/>
+              </a:rPr>
+              <a:t>Be on-time</a:t>
+            </a:r>
+          </a:p>
+          <a:p>
+            <a:r>
+              <a:rPr lang="en-US" dirty="0">
+                <a:cs typeface="Arial" pitchFamily="34" charset="0"/>
+              </a:rPr>
+              <a:t>1 x folder</a:t>
+            </a:r>
+          </a:p>
+          <a:p>
+            <a:r>
+              <a:rPr lang="en-US" dirty="0">
+                <a:cs typeface="Arial" pitchFamily="34" charset="0"/>
+              </a:rPr>
+              <a:t>1 x 3 ring binder with paper OR notebook for notes, sketches and ideation</a:t>
+            </a:r>
+          </a:p>
+          <a:p>
+            <a:r>
+              <a:rPr lang="en-US" dirty="0">
+                <a:cs typeface="Arial" pitchFamily="34" charset="0"/>
+              </a:rPr>
+              <a:t>1 x Bound Notebook</a:t>
+            </a:r>
+          </a:p>
+          <a:p>
+            <a:pPr marL="0" indent="0">
+              <a:buNone/>
+            </a:pPr>
+            <a:r>
+              <a:rPr lang="en-US" sz="1400" dirty="0">
+                <a:cs typeface="Arial" pitchFamily="34" charset="0"/>
+              </a:rPr>
+              <a:t>***Laptops are allowed and encouraged as long as they are utilized towards course work and not a distraction or they will not be permitted in class. All students are provided the G Suite of tools via Google and their school account.***</a:t>
             </a:r>
           </a:p>
         </p:txBody>
@@ -4215,7 +4230,7 @@
     </p:spTree>
     <p:extLst>
       <p:ext uri="{BB962C8B-B14F-4D97-AF65-F5344CB8AC3E}">
-        <p14:creationId xmlns:p14="http://schemas.microsoft.com/office/powerpoint/2010/main" val="78530218"/>
+        <p14:creationId xmlns:p14="http://schemas.microsoft.com/office/powerpoint/2010/main" val="2523332612"/>
       </p:ext>
     </p:extLst>
   </p:cSld>
@@ -4485,7 +4500,7 @@
               <a:rPr lang="en-US" dirty="0">
                 <a:cs typeface="Arial" pitchFamily="34" charset="0"/>
               </a:rPr>
-              <a:t>Introduction &amp; Design Process</a:t>
+              <a:t>Introduction</a:t>
             </a:r>
           </a:p>
           <a:p>
@@ -4497,7 +4512,7 @@
               <a:rPr lang="en-US" dirty="0">
                 <a:cs typeface="Arial" pitchFamily="34" charset="0"/>
               </a:rPr>
-              <a:t>Title Block</a:t>
+              <a:t>Design Process</a:t>
             </a:r>
           </a:p>
           <a:p>
@@ -4557,7 +4572,7 @@
               <a:rPr lang="en-US" dirty="0">
                 <a:cs typeface="Arial" pitchFamily="34" charset="0"/>
               </a:rPr>
-              <a:t>Introduction to SketchUp</a:t>
+              <a:t>Dimensioning</a:t>
             </a:r>
           </a:p>
           <a:p>
@@ -4569,7 +4584,7 @@
               <a:rPr lang="en-US" dirty="0">
                 <a:cs typeface="Arial" pitchFamily="34" charset="0"/>
               </a:rPr>
-              <a:t>SketchUp Multiview Drawings</a:t>
+              <a:t>Models</a:t>
             </a:r>
           </a:p>
           <a:p>
@@ -4581,7 +4596,7 @@
               <a:rPr lang="en-US" dirty="0">
                 <a:cs typeface="Arial" pitchFamily="34" charset="0"/>
               </a:rPr>
-              <a:t>SketchUp 3D Modeling</a:t>
+              <a:t>Puzzle Cube Design Challenge</a:t>
             </a:r>
           </a:p>
           <a:p>
@@ -4593,7 +4608,7 @@
               <a:rPr lang="en-US" dirty="0">
                 <a:cs typeface="Arial" pitchFamily="34" charset="0"/>
               </a:rPr>
-              <a:t>Puzzle Cube Design Challenge</a:t>
+              <a:t>Reverse Engineering</a:t>
             </a:r>
           </a:p>
           <a:p>
@@ -4605,7 +4620,7 @@
               <a:rPr lang="en-US" dirty="0">
                 <a:cs typeface="Arial" pitchFamily="34" charset="0"/>
               </a:rPr>
-              <a:t>Reverse Engineering</a:t>
+              <a:t>Cardboard Chair Challenge</a:t>
             </a:r>
           </a:p>
         </p:txBody>
@@ -4642,128 +4657,6 @@
     <p:extLst>
       <p:ext uri="{BB962C8B-B14F-4D97-AF65-F5344CB8AC3E}">
         <p14:creationId xmlns:p14="http://schemas.microsoft.com/office/powerpoint/2010/main" val="3332330429"/>
-      </p:ext>
-    </p:extLst>
-  </p:cSld>
-  <p:clrMapOvr>
-    <a:masterClrMapping/>
-  </p:clrMapOvr>
-  <mc:AlternateContent xmlns:mc="http://schemas.openxmlformats.org/markup-compatibility/2006" xmlns:p14="http://schemas.microsoft.com/office/powerpoint/2010/main">
-    <mc:Choice Requires="p14">
-      <p:transition spd="med" p14:dur="700">
-        <p:fade/>
-      </p:transition>
-    </mc:Choice>
-    <mc:Fallback xmlns="">
-      <p:transition spd="med">
-        <p:fade/>
-      </p:transition>
-    </mc:Fallback>
-  </mc:AlternateContent>
-</p:sld>
-</file>
-
-<file path=ppt/slides/slide6.xml><?xml version="1.0" encoding="utf-8"?>
-<p:sld xmlns:a="http://schemas.openxmlformats.org/drawingml/2006/main" xmlns:r="http://schemas.openxmlformats.org/officeDocument/2006/relationships" xmlns:p="http://schemas.openxmlformats.org/presentationml/2006/main">
-  <p:cSld>
-    <p:spTree>
-      <p:nvGrpSpPr>
-        <p:cNvPr id="1" name=""/>
-        <p:cNvGrpSpPr/>
-        <p:nvPr/>
-      </p:nvGrpSpPr>
-      <p:grpSpPr>
-        <a:xfrm>
-          <a:off x="0" y="0"/>
-          <a:ext cx="0" cy="0"/>
-          <a:chOff x="0" y="0"/>
-          <a:chExt cx="0" cy="0"/>
-        </a:xfrm>
-      </p:grpSpPr>
-      <p:sp>
-        <p:nvSpPr>
-          <p:cNvPr id="2" name="Title 1"/>
-          <p:cNvSpPr>
-            <a:spLocks noGrp="1"/>
-          </p:cNvSpPr>
-          <p:nvPr>
-            <p:ph type="title"/>
-          </p:nvPr>
-        </p:nvSpPr>
-        <p:spPr/>
-        <p:txBody>
-          <a:bodyPr/>
-          <a:lstStyle/>
-          <a:p>
-            <a:r>
-              <a:rPr lang="en-US" dirty="0"/>
-              <a:t>Google classroom code</a:t>
-            </a:r>
-          </a:p>
-        </p:txBody>
-      </p:sp>
-      <p:sp>
-        <p:nvSpPr>
-          <p:cNvPr id="3" name="Content Placeholder 2"/>
-          <p:cNvSpPr>
-            <a:spLocks noGrp="1"/>
-          </p:cNvSpPr>
-          <p:nvPr>
-            <p:ph idx="1"/>
-          </p:nvPr>
-        </p:nvSpPr>
-        <p:spPr/>
-        <p:txBody>
-          <a:bodyPr>
-            <a:normAutofit/>
-          </a:bodyPr>
-          <a:lstStyle/>
-          <a:p>
-            <a:pPr marL="0" indent="0" algn="ctr">
-              <a:buNone/>
-            </a:pPr>
-            <a:r>
-              <a:rPr lang="en-US" sz="16900" b="1"/>
-              <a:t>okia9n</a:t>
-            </a:r>
-            <a:endParaRPr lang="en-US" sz="16900" b="1" dirty="0">
-              <a:cs typeface="Arial" pitchFamily="34" charset="0"/>
-            </a:endParaRPr>
-          </a:p>
-        </p:txBody>
-      </p:sp>
-      <p:sp>
-        <p:nvSpPr>
-          <p:cNvPr id="4" name="Footer Placeholder 3">
-            <a:extLst>
-              <a:ext uri="{FF2B5EF4-FFF2-40B4-BE49-F238E27FC236}">
-                <a16:creationId xmlns:a16="http://schemas.microsoft.com/office/drawing/2014/main" id="{EADFB87E-2A3F-4815-8F5E-3CF3521EBF24}"/>
-              </a:ext>
-            </a:extLst>
-          </p:cNvPr>
-          <p:cNvSpPr>
-            <a:spLocks noGrp="1"/>
-          </p:cNvSpPr>
-          <p:nvPr>
-            <p:ph type="ftr" sz="quarter" idx="11"/>
-          </p:nvPr>
-        </p:nvSpPr>
-        <p:spPr/>
-        <p:txBody>
-          <a:bodyPr/>
-          <a:lstStyle/>
-          <a:p>
-            <a:r>
-              <a:rPr lang="en-US" dirty="0"/>
-              <a:t>Unit 1 – Section 1 - Day 1</a:t>
-            </a:r>
-          </a:p>
-        </p:txBody>
-      </p:sp>
-    </p:spTree>
-    <p:extLst>
-      <p:ext uri="{BB962C8B-B14F-4D97-AF65-F5344CB8AC3E}">
-        <p14:creationId xmlns:p14="http://schemas.microsoft.com/office/powerpoint/2010/main" val="1645033752"/>
       </p:ext>
     </p:extLst>
   </p:cSld>

</xml_diff>